<commit_message>
Adding object without ctor
</commit_message>
<xml_diff>
--- a/PSCONFEU_Perf2017.pptx
+++ b/PSCONFEU_Perf2017.pptx
@@ -6,10 +6,10 @@
     <p:sldMasterId id="2147483809" r:id="rId2"/>
   </p:sldMasterIdLst>
   <p:notesMasterIdLst>
-    <p:notesMasterId r:id="rId19"/>
+    <p:notesMasterId r:id="rId18"/>
   </p:notesMasterIdLst>
   <p:handoutMasterIdLst>
-    <p:handoutMasterId r:id="rId20"/>
+    <p:handoutMasterId r:id="rId19"/>
   </p:handoutMasterIdLst>
   <p:sldIdLst>
     <p:sldId id="316" r:id="rId3"/>
@@ -23,11 +23,10 @@
     <p:sldId id="324" r:id="rId11"/>
     <p:sldId id="323" r:id="rId12"/>
     <p:sldId id="320" r:id="rId13"/>
-    <p:sldId id="318" r:id="rId14"/>
-    <p:sldId id="321" r:id="rId15"/>
-    <p:sldId id="313" r:id="rId16"/>
-    <p:sldId id="314" r:id="rId17"/>
-    <p:sldId id="312" r:id="rId18"/>
+    <p:sldId id="321" r:id="rId14"/>
+    <p:sldId id="313" r:id="rId15"/>
+    <p:sldId id="314" r:id="rId16"/>
+    <p:sldId id="312" r:id="rId17"/>
   </p:sldIdLst>
   <p:sldSz cx="9144000" cy="6858000" type="screen4x3"/>
   <p:notesSz cx="7099300" cy="10234613"/>
@@ -1307,6 +1306,134 @@
     <p:extLst>
       <p:ext uri="{BB962C8B-B14F-4D97-AF65-F5344CB8AC3E}">
         <p14:creationId xmlns:p14="http://schemas.microsoft.com/office/powerpoint/2010/main" val="3132098537"/>
+      </p:ext>
+    </p:extLst>
+  </p:cSld>
+  <p:clrMapOvr>
+    <a:masterClrMapping/>
+  </p:clrMapOvr>
+</p:notes>
+</file>
+
+<file path=ppt/notesSlides/notesSlide3.xml><?xml version="1.0" encoding="utf-8"?>
+<p:notes xmlns:a="http://schemas.openxmlformats.org/drawingml/2006/main" xmlns:r="http://schemas.openxmlformats.org/officeDocument/2006/relationships" xmlns:p="http://schemas.openxmlformats.org/presentationml/2006/main">
+  <p:cSld>
+    <p:spTree>
+      <p:nvGrpSpPr>
+        <p:cNvPr id="1" name=""/>
+        <p:cNvGrpSpPr/>
+        <p:nvPr/>
+      </p:nvGrpSpPr>
+      <p:grpSpPr>
+        <a:xfrm>
+          <a:off x="0" y="0"/>
+          <a:ext cx="0" cy="0"/>
+          <a:chOff x="0" y="0"/>
+          <a:chExt cx="0" cy="0"/>
+        </a:xfrm>
+      </p:grpSpPr>
+      <p:sp>
+        <p:nvSpPr>
+          <p:cNvPr id="2" name="Platshållare för bildobjekt 1"/>
+          <p:cNvSpPr>
+            <a:spLocks noGrp="1" noRot="1" noChangeAspect="1"/>
+          </p:cNvSpPr>
+          <p:nvPr>
+            <p:ph type="sldImg"/>
+          </p:nvPr>
+        </p:nvSpPr>
+        <p:spPr/>
+      </p:sp>
+      <p:sp>
+        <p:nvSpPr>
+          <p:cNvPr id="3" name="Platshållare för anteckningar 2"/>
+          <p:cNvSpPr>
+            <a:spLocks noGrp="1"/>
+          </p:cNvSpPr>
+          <p:nvPr>
+            <p:ph type="body" idx="1"/>
+          </p:nvPr>
+        </p:nvSpPr>
+        <p:spPr/>
+        <p:txBody>
+          <a:bodyPr/>
+          <a:lstStyle/>
+          <a:p>
+            <a:r>
+              <a:rPr lang="en-US" dirty="0"/>
+              <a:t>ObjectCreation.ps1</a:t>
+            </a:r>
+          </a:p>
+          <a:p>
+            <a:endParaRPr lang="en-US" dirty="0"/>
+          </a:p>
+          <a:p>
+            <a:r>
+              <a:rPr lang="en-US" dirty="0"/>
+              <a:t>ObjectCreation.psm1</a:t>
+            </a:r>
+          </a:p>
+          <a:p>
+            <a:r>
+              <a:rPr lang="en-US" dirty="0" err="1"/>
+              <a:t>Src</a:t>
+            </a:r>
+            <a:r>
+              <a:rPr lang="en-US" dirty="0"/>
+              <a:t>/</a:t>
+            </a:r>
+            <a:r>
+              <a:rPr lang="en-US" dirty="0" err="1"/>
+              <a:t>cs</a:t>
+            </a:r>
+            <a:r>
+              <a:rPr lang="en-US" dirty="0"/>
+              <a:t>/</a:t>
+            </a:r>
+            <a:r>
+              <a:rPr lang="en-US" err="1"/>
+              <a:t>DotnetPerson</a:t>
+            </a:r>
+            <a:r>
+              <a:rPr lang="en-US"/>
+              <a:t>.cs</a:t>
+            </a:r>
+          </a:p>
+        </p:txBody>
+      </p:sp>
+      <p:sp>
+        <p:nvSpPr>
+          <p:cNvPr id="4" name="Platshållare för bildnummer 3"/>
+          <p:cNvSpPr>
+            <a:spLocks noGrp="1"/>
+          </p:cNvSpPr>
+          <p:nvPr>
+            <p:ph type="sldNum" sz="quarter" idx="10"/>
+          </p:nvPr>
+        </p:nvSpPr>
+        <p:spPr/>
+        <p:txBody>
+          <a:bodyPr/>
+          <a:lstStyle/>
+          <a:p>
+            <a:pPr>
+              <a:defRPr/>
+            </a:pPr>
+            <a:fld id="{0C6D6275-D5B4-459A-B2A3-212CA60D2300}" type="slidenum">
+              <a:rPr lang="de-DE" smtClean="0"/>
+              <a:pPr>
+                <a:defRPr/>
+              </a:pPr>
+              <a:t>5</a:t>
+            </a:fld>
+            <a:endParaRPr lang="de-DE"/>
+          </a:p>
+        </p:txBody>
+      </p:sp>
+    </p:spTree>
+    <p:extLst>
+      <p:ext uri="{BB962C8B-B14F-4D97-AF65-F5344CB8AC3E}">
+        <p14:creationId xmlns:p14="http://schemas.microsoft.com/office/powerpoint/2010/main" val="2980991662"/>
       </p:ext>
     </p:extLst>
   </p:cSld>
@@ -4683,7 +4810,7 @@
               <a:t> </a:t>
             </a:r>
             <a:r>
-              <a:rPr lang="de-DE"/>
+              <a:rPr lang="de-DE" dirty="0" err="1"/>
               <a:t>iteration</a:t>
             </a:r>
             <a:endParaRPr lang="de-DE" dirty="0"/>
@@ -4734,7 +4861,37 @@
       </p:grpSpPr>
       <p:sp>
         <p:nvSpPr>
-          <p:cNvPr id="2" name="Content Placeholder 1"/>
+          <p:cNvPr id="2" name="Titel 1"/>
+          <p:cNvSpPr>
+            <a:spLocks noGrp="1"/>
+          </p:cNvSpPr>
+          <p:nvPr>
+            <p:ph type="title"/>
+          </p:nvPr>
+        </p:nvSpPr>
+        <p:spPr>
+          <a:xfrm>
+            <a:off x="0" y="908720"/>
+            <a:ext cx="9144000" cy="792088"/>
+          </a:xfrm>
+          <a:prstGeom prst="rect">
+            <a:avLst/>
+          </a:prstGeom>
+        </p:spPr>
+        <p:txBody>
+          <a:bodyPr/>
+          <a:lstStyle/>
+          <a:p>
+            <a:r>
+              <a:rPr lang="de-DE" dirty="0"/>
+              <a:t>Summary</a:t>
+            </a:r>
+          </a:p>
+        </p:txBody>
+      </p:sp>
+      <p:sp>
+        <p:nvSpPr>
+          <p:cNvPr id="3" name="Inhaltsplatzhalter 2"/>
           <p:cNvSpPr>
             <a:spLocks noGrp="1"/>
           </p:cNvSpPr>
@@ -4744,1035 +4901,234 @@
         </p:nvSpPr>
         <p:spPr/>
         <p:txBody>
-          <a:bodyPr>
-            <a:normAutofit fontScale="92500" lnSpcReduction="10000"/>
-          </a:bodyPr>
+          <a:bodyPr/>
           <a:lstStyle/>
           <a:p>
-            <a:r>
-              <a:rPr lang="sv-SE" sz="1400" dirty="0"/>
-              <a:t> </a:t>
-            </a:r>
-            <a:r>
-              <a:rPr lang="sv-SE" sz="1400" dirty="0" err="1">
-                <a:solidFill>
-                  <a:srgbClr val="00008B"/>
-                </a:solidFill>
-                <a:latin typeface="Lucida Console" panose="020B0609040504020204" pitchFamily="49" charset="0"/>
-              </a:rPr>
-              <a:t>function</a:t>
-            </a:r>
-            <a:r>
-              <a:rPr lang="sv-SE" sz="1400" dirty="0">
-                <a:solidFill>
-                  <a:prstClr val="black"/>
-                </a:solidFill>
-                <a:latin typeface="Lucida Console" panose="020B0609040504020204" pitchFamily="49" charset="0"/>
-              </a:rPr>
-              <a:t> </a:t>
-            </a:r>
-            <a:r>
-              <a:rPr lang="sv-SE" sz="1400" dirty="0">
-                <a:solidFill>
-                  <a:srgbClr val="8A2BE2"/>
-                </a:solidFill>
-                <a:latin typeface="Lucida Console" panose="020B0609040504020204" pitchFamily="49" charset="0"/>
-              </a:rPr>
-              <a:t>Get-</a:t>
-            </a:r>
-            <a:r>
-              <a:rPr lang="sv-SE" sz="1400" dirty="0" err="1">
-                <a:solidFill>
-                  <a:srgbClr val="8A2BE2"/>
-                </a:solidFill>
-                <a:latin typeface="Lucida Console" panose="020B0609040504020204" pitchFamily="49" charset="0"/>
-              </a:rPr>
-              <a:t>Sum</a:t>
-            </a:r>
-            <a:r>
-              <a:rPr lang="sv-SE" sz="1400" dirty="0">
-                <a:solidFill>
-                  <a:prstClr val="black"/>
-                </a:solidFill>
-                <a:latin typeface="Lucida Console" panose="020B0609040504020204" pitchFamily="49" charset="0"/>
-              </a:rPr>
-              <a:t> {</a:t>
-            </a:r>
-          </a:p>
-          <a:p>
-            <a:r>
-              <a:rPr lang="sv-SE" sz="1400" dirty="0">
-                <a:solidFill>
-                  <a:prstClr val="black"/>
-                </a:solidFill>
-                <a:latin typeface="Lucida Console" panose="020B0609040504020204" pitchFamily="49" charset="0"/>
-              </a:rPr>
-              <a:t>    </a:t>
-            </a:r>
-            <a:r>
-              <a:rPr lang="sv-SE" sz="1400" dirty="0" err="1">
-                <a:solidFill>
-                  <a:srgbClr val="00008B"/>
-                </a:solidFill>
-                <a:latin typeface="Lucida Console" panose="020B0609040504020204" pitchFamily="49" charset="0"/>
-              </a:rPr>
-              <a:t>param</a:t>
-            </a:r>
-            <a:r>
-              <a:rPr lang="sv-SE" sz="1400" dirty="0">
-                <a:solidFill>
-                  <a:prstClr val="black"/>
-                </a:solidFill>
-                <a:latin typeface="Lucida Console" panose="020B0609040504020204" pitchFamily="49" charset="0"/>
-              </a:rPr>
-              <a:t>(</a:t>
-            </a:r>
-          </a:p>
-          <a:p>
-            <a:r>
-              <a:rPr lang="sv-SE" sz="1400" dirty="0">
-                <a:solidFill>
-                  <a:prstClr val="black"/>
-                </a:solidFill>
-                <a:latin typeface="Lucida Console" panose="020B0609040504020204" pitchFamily="49" charset="0"/>
-              </a:rPr>
-              <a:t>        </a:t>
-            </a:r>
-            <a:r>
-              <a:rPr lang="sv-SE" sz="1400" dirty="0">
-                <a:solidFill>
-                  <a:srgbClr val="A9A9A9"/>
-                </a:solidFill>
-                <a:latin typeface="Lucida Console" panose="020B0609040504020204" pitchFamily="49" charset="0"/>
-              </a:rPr>
-              <a:t>[</a:t>
-            </a:r>
-            <a:r>
-              <a:rPr lang="sv-SE" sz="1400" dirty="0">
-                <a:solidFill>
-                  <a:srgbClr val="00BFFF"/>
-                </a:solidFill>
-                <a:latin typeface="Lucida Console" panose="020B0609040504020204" pitchFamily="49" charset="0"/>
-              </a:rPr>
-              <a:t>Parameter</a:t>
-            </a:r>
-            <a:r>
-              <a:rPr lang="sv-SE" sz="1400" dirty="0">
-                <a:solidFill>
-                  <a:prstClr val="black"/>
-                </a:solidFill>
-                <a:latin typeface="Lucida Console" panose="020B0609040504020204" pitchFamily="49" charset="0"/>
-              </a:rPr>
-              <a:t>(</a:t>
-            </a:r>
-            <a:r>
-              <a:rPr lang="sv-SE" sz="1400" dirty="0" err="1">
-                <a:solidFill>
-                  <a:prstClr val="black"/>
-                </a:solidFill>
-                <a:latin typeface="Lucida Console" panose="020B0609040504020204" pitchFamily="49" charset="0"/>
-              </a:rPr>
-              <a:t>ValueFromPipeline</a:t>
-            </a:r>
-            <a:r>
-              <a:rPr lang="sv-SE" sz="1400" dirty="0">
-                <a:solidFill>
-                  <a:prstClr val="black"/>
-                </a:solidFill>
-                <a:latin typeface="Lucida Console" panose="020B0609040504020204" pitchFamily="49" charset="0"/>
-              </a:rPr>
-              <a:t>)</a:t>
-            </a:r>
-            <a:r>
-              <a:rPr lang="sv-SE" sz="1400" dirty="0">
-                <a:solidFill>
-                  <a:srgbClr val="A9A9A9"/>
-                </a:solidFill>
-                <a:latin typeface="Lucida Console" panose="020B0609040504020204" pitchFamily="49" charset="0"/>
-              </a:rPr>
-              <a:t>]</a:t>
-            </a:r>
-            <a:endParaRPr lang="sv-SE" sz="1400" dirty="0">
-              <a:solidFill>
-                <a:prstClr val="black"/>
-              </a:solidFill>
-              <a:latin typeface="Lucida Console" panose="020B0609040504020204" pitchFamily="49" charset="0"/>
-            </a:endParaRPr>
-          </a:p>
-          <a:p>
-            <a:r>
-              <a:rPr lang="sv-SE" sz="1400" dirty="0">
-                <a:solidFill>
-                  <a:prstClr val="black"/>
-                </a:solidFill>
-                <a:latin typeface="Lucida Console" panose="020B0609040504020204" pitchFamily="49" charset="0"/>
-              </a:rPr>
-              <a:t>        </a:t>
-            </a:r>
-            <a:r>
-              <a:rPr lang="sv-SE" sz="1400" dirty="0">
-                <a:solidFill>
-                  <a:srgbClr val="A9A9A9"/>
-                </a:solidFill>
-                <a:latin typeface="Lucida Console" panose="020B0609040504020204" pitchFamily="49" charset="0"/>
-              </a:rPr>
-              <a:t>[</a:t>
-            </a:r>
-            <a:r>
-              <a:rPr lang="sv-SE" sz="1400" dirty="0" err="1">
-                <a:solidFill>
-                  <a:srgbClr val="008080"/>
-                </a:solidFill>
-                <a:latin typeface="Lucida Console" panose="020B0609040504020204" pitchFamily="49" charset="0"/>
-              </a:rPr>
-              <a:t>int</a:t>
-            </a:r>
-            <a:r>
-              <a:rPr lang="sv-SE" sz="1400" dirty="0">
-                <a:solidFill>
-                  <a:srgbClr val="A9A9A9"/>
-                </a:solidFill>
-                <a:latin typeface="Lucida Console" panose="020B0609040504020204" pitchFamily="49" charset="0"/>
-              </a:rPr>
-              <a:t>[]]</a:t>
-            </a:r>
-            <a:r>
-              <a:rPr lang="sv-SE" sz="1400" dirty="0">
-                <a:solidFill>
-                  <a:prstClr val="black"/>
-                </a:solidFill>
-                <a:latin typeface="Lucida Console" panose="020B0609040504020204" pitchFamily="49" charset="0"/>
-              </a:rPr>
-              <a:t> </a:t>
-            </a:r>
-            <a:r>
-              <a:rPr lang="sv-SE" sz="1400" dirty="0">
-                <a:solidFill>
-                  <a:srgbClr val="FF4500"/>
-                </a:solidFill>
-                <a:latin typeface="Lucida Console" panose="020B0609040504020204" pitchFamily="49" charset="0"/>
-              </a:rPr>
-              <a:t>$</a:t>
-            </a:r>
-            <a:r>
-              <a:rPr lang="sv-SE" sz="1400" dirty="0" err="1">
-                <a:solidFill>
-                  <a:srgbClr val="FF4500"/>
-                </a:solidFill>
-                <a:latin typeface="Lucida Console" panose="020B0609040504020204" pitchFamily="49" charset="0"/>
-              </a:rPr>
-              <a:t>Number</a:t>
-            </a:r>
-            <a:endParaRPr lang="sv-SE" sz="1400" dirty="0">
-              <a:solidFill>
-                <a:prstClr val="black"/>
-              </a:solidFill>
-              <a:latin typeface="Lucida Console" panose="020B0609040504020204" pitchFamily="49" charset="0"/>
-            </a:endParaRPr>
-          </a:p>
-          <a:p>
-            <a:r>
-              <a:rPr lang="sv-SE" sz="1400" dirty="0">
-                <a:solidFill>
-                  <a:prstClr val="black"/>
-                </a:solidFill>
-                <a:latin typeface="Lucida Console" panose="020B0609040504020204" pitchFamily="49" charset="0"/>
-              </a:rPr>
-              <a:t>    )</a:t>
-            </a:r>
-          </a:p>
-          <a:p>
-            <a:r>
-              <a:rPr lang="sv-SE" sz="1400" dirty="0">
-                <a:solidFill>
-                  <a:prstClr val="black"/>
-                </a:solidFill>
-                <a:latin typeface="Lucida Console" panose="020B0609040504020204" pitchFamily="49" charset="0"/>
-              </a:rPr>
-              <a:t>    </a:t>
-            </a:r>
-            <a:r>
-              <a:rPr lang="sv-SE" sz="1400" dirty="0" err="1">
-                <a:solidFill>
-                  <a:srgbClr val="00008B"/>
-                </a:solidFill>
-                <a:latin typeface="Lucida Console" panose="020B0609040504020204" pitchFamily="49" charset="0"/>
-              </a:rPr>
-              <a:t>begin</a:t>
-            </a:r>
-            <a:r>
-              <a:rPr lang="sv-SE" sz="1400" dirty="0">
-                <a:solidFill>
-                  <a:prstClr val="black"/>
-                </a:solidFill>
-                <a:latin typeface="Lucida Console" panose="020B0609040504020204" pitchFamily="49" charset="0"/>
-              </a:rPr>
-              <a:t> {</a:t>
-            </a:r>
-          </a:p>
-          <a:p>
-            <a:r>
-              <a:rPr lang="sv-SE" sz="1400" dirty="0">
-                <a:solidFill>
-                  <a:prstClr val="black"/>
-                </a:solidFill>
-                <a:latin typeface="Lucida Console" panose="020B0609040504020204" pitchFamily="49" charset="0"/>
-              </a:rPr>
-              <a:t>        </a:t>
-            </a:r>
-            <a:r>
-              <a:rPr lang="sv-SE" sz="1400" dirty="0">
-                <a:solidFill>
-                  <a:srgbClr val="FF4500"/>
-                </a:solidFill>
-                <a:latin typeface="Lucida Console" panose="020B0609040504020204" pitchFamily="49" charset="0"/>
-              </a:rPr>
-              <a:t>$</a:t>
-            </a:r>
-            <a:r>
-              <a:rPr lang="sv-SE" sz="1400" dirty="0" err="1">
-                <a:solidFill>
-                  <a:srgbClr val="FF4500"/>
-                </a:solidFill>
-                <a:latin typeface="Lucida Console" panose="020B0609040504020204" pitchFamily="49" charset="0"/>
-              </a:rPr>
-              <a:t>sum</a:t>
-            </a:r>
-            <a:r>
-              <a:rPr lang="sv-SE" sz="1400" dirty="0">
-                <a:solidFill>
-                  <a:prstClr val="black"/>
-                </a:solidFill>
-                <a:latin typeface="Lucida Console" panose="020B0609040504020204" pitchFamily="49" charset="0"/>
-              </a:rPr>
-              <a:t> </a:t>
-            </a:r>
-            <a:r>
-              <a:rPr lang="sv-SE" sz="1400" dirty="0">
-                <a:solidFill>
-                  <a:srgbClr val="A9A9A9"/>
-                </a:solidFill>
-                <a:latin typeface="Lucida Console" panose="020B0609040504020204" pitchFamily="49" charset="0"/>
-              </a:rPr>
-              <a:t>=</a:t>
-            </a:r>
-            <a:r>
-              <a:rPr lang="sv-SE" sz="1400" dirty="0">
-                <a:solidFill>
-                  <a:prstClr val="black"/>
-                </a:solidFill>
-                <a:latin typeface="Lucida Console" panose="020B0609040504020204" pitchFamily="49" charset="0"/>
-              </a:rPr>
-              <a:t> </a:t>
-            </a:r>
-            <a:r>
-              <a:rPr lang="sv-SE" sz="1400" dirty="0">
-                <a:solidFill>
-                  <a:srgbClr val="800080"/>
-                </a:solidFill>
-                <a:latin typeface="Lucida Console" panose="020B0609040504020204" pitchFamily="49" charset="0"/>
-              </a:rPr>
-              <a:t>0</a:t>
-            </a:r>
-            <a:endParaRPr lang="sv-SE" sz="1400" dirty="0">
-              <a:solidFill>
-                <a:prstClr val="black"/>
-              </a:solidFill>
-              <a:latin typeface="Lucida Console" panose="020B0609040504020204" pitchFamily="49" charset="0"/>
-            </a:endParaRPr>
-          </a:p>
-          <a:p>
-            <a:r>
-              <a:rPr lang="sv-SE" sz="1400" dirty="0">
-                <a:solidFill>
-                  <a:prstClr val="black"/>
-                </a:solidFill>
-                <a:latin typeface="Lucida Console" panose="020B0609040504020204" pitchFamily="49" charset="0"/>
-              </a:rPr>
-              <a:t>    }</a:t>
-            </a:r>
-          </a:p>
-          <a:p>
-            <a:r>
-              <a:rPr lang="sv-SE" sz="1400" dirty="0">
-                <a:solidFill>
-                  <a:prstClr val="black"/>
-                </a:solidFill>
-                <a:latin typeface="Lucida Console" panose="020B0609040504020204" pitchFamily="49" charset="0"/>
-              </a:rPr>
-              <a:t>    </a:t>
-            </a:r>
-            <a:r>
-              <a:rPr lang="sv-SE" sz="1400" dirty="0">
-                <a:solidFill>
-                  <a:srgbClr val="00008B"/>
-                </a:solidFill>
-                <a:latin typeface="Lucida Console" panose="020B0609040504020204" pitchFamily="49" charset="0"/>
-              </a:rPr>
-              <a:t>process</a:t>
-            </a:r>
-            <a:r>
-              <a:rPr lang="sv-SE" sz="1400" dirty="0">
-                <a:solidFill>
-                  <a:prstClr val="black"/>
-                </a:solidFill>
-                <a:latin typeface="Lucida Console" panose="020B0609040504020204" pitchFamily="49" charset="0"/>
-              </a:rPr>
-              <a:t> {</a:t>
-            </a:r>
-          </a:p>
-          <a:p>
-            <a:r>
-              <a:rPr lang="sv-SE" sz="1400" dirty="0">
-                <a:solidFill>
-                  <a:prstClr val="black"/>
-                </a:solidFill>
-                <a:latin typeface="Lucida Console" panose="020B0609040504020204" pitchFamily="49" charset="0"/>
-              </a:rPr>
-              <a:t>        </a:t>
-            </a:r>
-            <a:r>
-              <a:rPr lang="sv-SE" sz="1400" dirty="0" err="1">
-                <a:solidFill>
-                  <a:srgbClr val="00008B"/>
-                </a:solidFill>
-                <a:latin typeface="Lucida Console" panose="020B0609040504020204" pitchFamily="49" charset="0"/>
-              </a:rPr>
-              <a:t>foreach</a:t>
-            </a:r>
-            <a:r>
-              <a:rPr lang="sv-SE" sz="1400" dirty="0">
-                <a:solidFill>
-                  <a:prstClr val="black"/>
-                </a:solidFill>
-                <a:latin typeface="Lucida Console" panose="020B0609040504020204" pitchFamily="49" charset="0"/>
-              </a:rPr>
-              <a:t>(</a:t>
-            </a:r>
-            <a:r>
-              <a:rPr lang="sv-SE" sz="1400" dirty="0">
-                <a:solidFill>
-                  <a:srgbClr val="FF4500"/>
-                </a:solidFill>
-                <a:latin typeface="Lucida Console" panose="020B0609040504020204" pitchFamily="49" charset="0"/>
-              </a:rPr>
-              <a:t>$i</a:t>
-            </a:r>
-            <a:r>
-              <a:rPr lang="sv-SE" sz="1400" dirty="0">
-                <a:solidFill>
-                  <a:prstClr val="black"/>
-                </a:solidFill>
-                <a:latin typeface="Lucida Console" panose="020B0609040504020204" pitchFamily="49" charset="0"/>
-              </a:rPr>
-              <a:t> </a:t>
-            </a:r>
-            <a:r>
-              <a:rPr lang="sv-SE" sz="1400" dirty="0">
-                <a:solidFill>
-                  <a:srgbClr val="00008B"/>
-                </a:solidFill>
-                <a:latin typeface="Lucida Console" panose="020B0609040504020204" pitchFamily="49" charset="0"/>
-              </a:rPr>
-              <a:t>in</a:t>
-            </a:r>
-            <a:r>
-              <a:rPr lang="sv-SE" sz="1400" dirty="0">
-                <a:solidFill>
-                  <a:prstClr val="black"/>
-                </a:solidFill>
-                <a:latin typeface="Lucida Console" panose="020B0609040504020204" pitchFamily="49" charset="0"/>
-              </a:rPr>
-              <a:t> </a:t>
-            </a:r>
-            <a:r>
-              <a:rPr lang="sv-SE" sz="1400" dirty="0">
-                <a:solidFill>
-                  <a:srgbClr val="FF4500"/>
-                </a:solidFill>
-                <a:latin typeface="Lucida Console" panose="020B0609040504020204" pitchFamily="49" charset="0"/>
-              </a:rPr>
-              <a:t>$</a:t>
-            </a:r>
-            <a:r>
-              <a:rPr lang="sv-SE" sz="1400" dirty="0" err="1">
-                <a:solidFill>
-                  <a:srgbClr val="FF4500"/>
-                </a:solidFill>
-                <a:latin typeface="Lucida Console" panose="020B0609040504020204" pitchFamily="49" charset="0"/>
-              </a:rPr>
-              <a:t>Number</a:t>
-            </a:r>
-            <a:r>
-              <a:rPr lang="sv-SE" sz="1400" dirty="0">
-                <a:solidFill>
-                  <a:prstClr val="black"/>
-                </a:solidFill>
-                <a:latin typeface="Lucida Console" panose="020B0609040504020204" pitchFamily="49" charset="0"/>
-              </a:rPr>
-              <a:t>){</a:t>
-            </a:r>
-          </a:p>
-          <a:p>
-            <a:r>
-              <a:rPr lang="sv-SE" sz="1400" dirty="0">
-                <a:solidFill>
-                  <a:prstClr val="black"/>
-                </a:solidFill>
-                <a:latin typeface="Lucida Console" panose="020B0609040504020204" pitchFamily="49" charset="0"/>
-              </a:rPr>
-              <a:t>            </a:t>
-            </a:r>
-            <a:r>
-              <a:rPr lang="sv-SE" sz="1400" dirty="0">
-                <a:solidFill>
-                  <a:srgbClr val="FF4500"/>
-                </a:solidFill>
-                <a:latin typeface="Lucida Console" panose="020B0609040504020204" pitchFamily="49" charset="0"/>
-              </a:rPr>
-              <a:t>$</a:t>
-            </a:r>
-            <a:r>
-              <a:rPr lang="sv-SE" sz="1400" dirty="0" err="1">
-                <a:solidFill>
-                  <a:srgbClr val="FF4500"/>
-                </a:solidFill>
-                <a:latin typeface="Lucida Console" panose="020B0609040504020204" pitchFamily="49" charset="0"/>
-              </a:rPr>
-              <a:t>sum</a:t>
-            </a:r>
-            <a:r>
-              <a:rPr lang="sv-SE" sz="1400" dirty="0">
-                <a:solidFill>
-                  <a:prstClr val="black"/>
-                </a:solidFill>
-                <a:latin typeface="Lucida Console" panose="020B0609040504020204" pitchFamily="49" charset="0"/>
-              </a:rPr>
-              <a:t> </a:t>
-            </a:r>
-            <a:r>
-              <a:rPr lang="sv-SE" sz="1400" dirty="0">
-                <a:solidFill>
-                  <a:srgbClr val="A9A9A9"/>
-                </a:solidFill>
-                <a:latin typeface="Lucida Console" panose="020B0609040504020204" pitchFamily="49" charset="0"/>
-              </a:rPr>
-              <a:t>+=</a:t>
-            </a:r>
-            <a:r>
-              <a:rPr lang="sv-SE" sz="1400" dirty="0">
-                <a:solidFill>
-                  <a:prstClr val="black"/>
-                </a:solidFill>
-                <a:latin typeface="Lucida Console" panose="020B0609040504020204" pitchFamily="49" charset="0"/>
-              </a:rPr>
-              <a:t> </a:t>
-            </a:r>
-            <a:r>
-              <a:rPr lang="sv-SE" sz="1400" dirty="0">
-                <a:solidFill>
-                  <a:srgbClr val="FF4500"/>
-                </a:solidFill>
-                <a:latin typeface="Lucida Console" panose="020B0609040504020204" pitchFamily="49" charset="0"/>
-              </a:rPr>
-              <a:t>$i</a:t>
-            </a:r>
-            <a:endParaRPr lang="sv-SE" sz="1400" dirty="0">
-              <a:solidFill>
-                <a:prstClr val="black"/>
-              </a:solidFill>
-              <a:latin typeface="Lucida Console" panose="020B0609040504020204" pitchFamily="49" charset="0"/>
-            </a:endParaRPr>
-          </a:p>
-          <a:p>
-            <a:r>
-              <a:rPr lang="sv-SE" sz="1400" dirty="0">
-                <a:solidFill>
-                  <a:prstClr val="black"/>
-                </a:solidFill>
-                <a:latin typeface="Lucida Console" panose="020B0609040504020204" pitchFamily="49" charset="0"/>
-              </a:rPr>
-              <a:t>        }</a:t>
-            </a:r>
-          </a:p>
-          <a:p>
-            <a:r>
-              <a:rPr lang="sv-SE" sz="1400" dirty="0">
-                <a:solidFill>
-                  <a:prstClr val="black"/>
-                </a:solidFill>
-                <a:latin typeface="Lucida Console" panose="020B0609040504020204" pitchFamily="49" charset="0"/>
-              </a:rPr>
-              <a:t>    }</a:t>
-            </a:r>
-          </a:p>
-          <a:p>
-            <a:r>
-              <a:rPr lang="sv-SE" sz="1400" dirty="0">
-                <a:solidFill>
-                  <a:prstClr val="black"/>
-                </a:solidFill>
-                <a:latin typeface="Lucida Console" panose="020B0609040504020204" pitchFamily="49" charset="0"/>
-              </a:rPr>
-              <a:t>    </a:t>
-            </a:r>
-            <a:r>
-              <a:rPr lang="sv-SE" sz="1400" dirty="0">
-                <a:solidFill>
-                  <a:srgbClr val="00008B"/>
-                </a:solidFill>
-                <a:latin typeface="Lucida Console" panose="020B0609040504020204" pitchFamily="49" charset="0"/>
-              </a:rPr>
-              <a:t>end</a:t>
-            </a:r>
-            <a:r>
-              <a:rPr lang="sv-SE" sz="1400" dirty="0">
-                <a:solidFill>
-                  <a:prstClr val="black"/>
-                </a:solidFill>
-                <a:latin typeface="Lucida Console" panose="020B0609040504020204" pitchFamily="49" charset="0"/>
-              </a:rPr>
-              <a:t> {</a:t>
-            </a:r>
-          </a:p>
-          <a:p>
-            <a:r>
-              <a:rPr lang="sv-SE" sz="1400" dirty="0">
-                <a:solidFill>
-                  <a:prstClr val="black"/>
-                </a:solidFill>
-                <a:latin typeface="Lucida Console" panose="020B0609040504020204" pitchFamily="49" charset="0"/>
-              </a:rPr>
-              <a:t>        </a:t>
-            </a:r>
-            <a:r>
-              <a:rPr lang="sv-SE" sz="1400" dirty="0">
-                <a:solidFill>
-                  <a:srgbClr val="FF4500"/>
-                </a:solidFill>
-                <a:latin typeface="Lucida Console" panose="020B0609040504020204" pitchFamily="49" charset="0"/>
-              </a:rPr>
-              <a:t>$</a:t>
-            </a:r>
-            <a:r>
-              <a:rPr lang="sv-SE" sz="1400" dirty="0" err="1">
-                <a:solidFill>
-                  <a:srgbClr val="FF4500"/>
-                </a:solidFill>
-                <a:latin typeface="Lucida Console" panose="020B0609040504020204" pitchFamily="49" charset="0"/>
-              </a:rPr>
-              <a:t>sum</a:t>
-            </a:r>
-            <a:endParaRPr lang="sv-SE" sz="1400" dirty="0">
-              <a:solidFill>
-                <a:prstClr val="black"/>
-              </a:solidFill>
-              <a:latin typeface="Lucida Console" panose="020B0609040504020204" pitchFamily="49" charset="0"/>
-            </a:endParaRPr>
-          </a:p>
-          <a:p>
-            <a:r>
-              <a:rPr lang="sv-SE" sz="1400" dirty="0">
-                <a:solidFill>
-                  <a:prstClr val="black"/>
-                </a:solidFill>
-                <a:latin typeface="Lucida Console" panose="020B0609040504020204" pitchFamily="49" charset="0"/>
-              </a:rPr>
-              <a:t>    }</a:t>
-            </a:r>
-          </a:p>
-          <a:p>
-            <a:r>
-              <a:rPr lang="sv-SE" sz="1400" dirty="0">
-                <a:solidFill>
-                  <a:prstClr val="black"/>
-                </a:solidFill>
-                <a:latin typeface="Lucida Console" panose="020B0609040504020204" pitchFamily="49" charset="0"/>
-              </a:rPr>
-              <a:t>}</a:t>
-            </a:r>
-          </a:p>
-          <a:p>
-            <a:endParaRPr lang="sv-SE" sz="1400" dirty="0">
-              <a:solidFill>
-                <a:prstClr val="black"/>
-              </a:solidFill>
-              <a:latin typeface="Lucida Console" panose="020B0609040504020204" pitchFamily="49" charset="0"/>
-            </a:endParaRPr>
-          </a:p>
-          <a:p>
-            <a:r>
-              <a:rPr lang="sv-SE" sz="1400" dirty="0">
-                <a:solidFill>
-                  <a:srgbClr val="FF4500"/>
-                </a:solidFill>
-                <a:latin typeface="Lucida Console" panose="020B0609040504020204" pitchFamily="49" charset="0"/>
-              </a:rPr>
-              <a:t>$</a:t>
-            </a:r>
-            <a:r>
-              <a:rPr lang="sv-SE" sz="1400" dirty="0" err="1">
-                <a:solidFill>
-                  <a:srgbClr val="FF4500"/>
-                </a:solidFill>
-                <a:latin typeface="Lucida Console" panose="020B0609040504020204" pitchFamily="49" charset="0"/>
-              </a:rPr>
-              <a:t>numbers</a:t>
-            </a:r>
-            <a:r>
-              <a:rPr lang="sv-SE" sz="1400" dirty="0">
-                <a:solidFill>
-                  <a:prstClr val="black"/>
-                </a:solidFill>
-                <a:latin typeface="Lucida Console" panose="020B0609040504020204" pitchFamily="49" charset="0"/>
-              </a:rPr>
-              <a:t> </a:t>
-            </a:r>
-            <a:r>
-              <a:rPr lang="sv-SE" sz="1400" dirty="0">
-                <a:solidFill>
-                  <a:srgbClr val="A9A9A9"/>
-                </a:solidFill>
-                <a:latin typeface="Lucida Console" panose="020B0609040504020204" pitchFamily="49" charset="0"/>
-              </a:rPr>
-              <a:t>=</a:t>
-            </a:r>
-            <a:r>
-              <a:rPr lang="sv-SE" sz="1400" dirty="0">
-                <a:solidFill>
-                  <a:prstClr val="black"/>
-                </a:solidFill>
-                <a:latin typeface="Lucida Console" panose="020B0609040504020204" pitchFamily="49" charset="0"/>
-              </a:rPr>
-              <a:t> </a:t>
-            </a:r>
-            <a:r>
-              <a:rPr lang="sv-SE" sz="1400" dirty="0">
-                <a:solidFill>
-                  <a:srgbClr val="800080"/>
-                </a:solidFill>
-                <a:latin typeface="Lucida Console" panose="020B0609040504020204" pitchFamily="49" charset="0"/>
-              </a:rPr>
-              <a:t>1</a:t>
-            </a:r>
-            <a:r>
-              <a:rPr lang="sv-SE" sz="1400" dirty="0">
-                <a:solidFill>
-                  <a:srgbClr val="A9A9A9"/>
-                </a:solidFill>
-                <a:latin typeface="Lucida Console" panose="020B0609040504020204" pitchFamily="49" charset="0"/>
-              </a:rPr>
-              <a:t>..</a:t>
-            </a:r>
-            <a:r>
-              <a:rPr lang="sv-SE" sz="1400" dirty="0">
-                <a:solidFill>
-                  <a:srgbClr val="800080"/>
-                </a:solidFill>
-                <a:latin typeface="Lucida Console" panose="020B0609040504020204" pitchFamily="49" charset="0"/>
-              </a:rPr>
-              <a:t>100000</a:t>
-            </a:r>
-            <a:endParaRPr lang="sv-SE" sz="1400" dirty="0">
-              <a:solidFill>
-                <a:prstClr val="black"/>
-              </a:solidFill>
-              <a:latin typeface="Lucida Console" panose="020B0609040504020204" pitchFamily="49" charset="0"/>
-            </a:endParaRPr>
-          </a:p>
-          <a:p>
-            <a:endParaRPr lang="sv-SE" sz="1400" dirty="0">
-              <a:solidFill>
-                <a:prstClr val="black"/>
-              </a:solidFill>
-              <a:latin typeface="Lucida Console" panose="020B0609040504020204" pitchFamily="49" charset="0"/>
-            </a:endParaRPr>
-          </a:p>
-          <a:p>
-            <a:r>
-              <a:rPr lang="sv-SE" sz="1400" dirty="0" err="1">
-                <a:solidFill>
-                  <a:srgbClr val="0000FF"/>
-                </a:solidFill>
-                <a:latin typeface="Lucida Console" panose="020B0609040504020204" pitchFamily="49" charset="0"/>
-              </a:rPr>
-              <a:t>Measure-Command</a:t>
-            </a:r>
-            <a:r>
-              <a:rPr lang="sv-SE" sz="1400" dirty="0">
-                <a:solidFill>
-                  <a:prstClr val="black"/>
-                </a:solidFill>
-                <a:latin typeface="Lucida Console" panose="020B0609040504020204" pitchFamily="49" charset="0"/>
-              </a:rPr>
-              <a:t> {</a:t>
-            </a:r>
-          </a:p>
-          <a:p>
-            <a:r>
-              <a:rPr lang="sv-SE" sz="1400" dirty="0">
-                <a:solidFill>
-                  <a:prstClr val="black"/>
-                </a:solidFill>
-                <a:latin typeface="Lucida Console" panose="020B0609040504020204" pitchFamily="49" charset="0"/>
-              </a:rPr>
-              <a:t>    </a:t>
-            </a:r>
-            <a:r>
-              <a:rPr lang="sv-SE" sz="1400" dirty="0">
-                <a:solidFill>
-                  <a:srgbClr val="FF4500"/>
-                </a:solidFill>
-                <a:latin typeface="Lucida Console" panose="020B0609040504020204" pitchFamily="49" charset="0"/>
-              </a:rPr>
-              <a:t>$</a:t>
-            </a:r>
-            <a:r>
-              <a:rPr lang="sv-SE" sz="1400" dirty="0" err="1">
-                <a:solidFill>
-                  <a:srgbClr val="FF4500"/>
-                </a:solidFill>
-                <a:latin typeface="Lucida Console" panose="020B0609040504020204" pitchFamily="49" charset="0"/>
-              </a:rPr>
-              <a:t>numbers</a:t>
-            </a:r>
-            <a:r>
-              <a:rPr lang="sv-SE" sz="1400" dirty="0">
-                <a:solidFill>
-                  <a:prstClr val="black"/>
-                </a:solidFill>
-                <a:latin typeface="Lucida Console" panose="020B0609040504020204" pitchFamily="49" charset="0"/>
-              </a:rPr>
-              <a:t> </a:t>
-            </a:r>
-            <a:r>
-              <a:rPr lang="sv-SE" sz="1400" dirty="0">
-                <a:solidFill>
-                  <a:srgbClr val="A9A9A9"/>
-                </a:solidFill>
-                <a:latin typeface="Lucida Console" panose="020B0609040504020204" pitchFamily="49" charset="0"/>
-              </a:rPr>
-              <a:t>|</a:t>
-            </a:r>
-            <a:r>
-              <a:rPr lang="sv-SE" sz="1400" dirty="0">
-                <a:solidFill>
-                  <a:prstClr val="black"/>
-                </a:solidFill>
-                <a:latin typeface="Lucida Console" panose="020B0609040504020204" pitchFamily="49" charset="0"/>
-              </a:rPr>
-              <a:t> </a:t>
-            </a:r>
-            <a:r>
-              <a:rPr lang="sv-SE" sz="1400" dirty="0">
-                <a:solidFill>
-                  <a:srgbClr val="0000FF"/>
-                </a:solidFill>
-                <a:latin typeface="Lucida Console" panose="020B0609040504020204" pitchFamily="49" charset="0"/>
-              </a:rPr>
-              <a:t>Get-</a:t>
-            </a:r>
-            <a:r>
-              <a:rPr lang="sv-SE" sz="1400" dirty="0" err="1">
-                <a:solidFill>
-                  <a:srgbClr val="0000FF"/>
-                </a:solidFill>
-                <a:latin typeface="Lucida Console" panose="020B0609040504020204" pitchFamily="49" charset="0"/>
-              </a:rPr>
-              <a:t>Sum</a:t>
-            </a:r>
-            <a:endParaRPr lang="sv-SE" sz="1400" dirty="0">
-              <a:solidFill>
-                <a:prstClr val="black"/>
-              </a:solidFill>
-              <a:latin typeface="Lucida Console" panose="020B0609040504020204" pitchFamily="49" charset="0"/>
-            </a:endParaRPr>
-          </a:p>
-          <a:p>
-            <a:r>
-              <a:rPr lang="sv-SE" sz="1400" dirty="0">
-                <a:solidFill>
-                  <a:prstClr val="black"/>
-                </a:solidFill>
-                <a:latin typeface="Lucida Console" panose="020B0609040504020204" pitchFamily="49" charset="0"/>
-              </a:rPr>
-              <a:t>}</a:t>
-            </a:r>
-          </a:p>
-          <a:p>
-            <a:endParaRPr lang="sv-SE" sz="1400" dirty="0">
-              <a:solidFill>
-                <a:prstClr val="black"/>
-              </a:solidFill>
-              <a:latin typeface="Lucida Console" panose="020B0609040504020204" pitchFamily="49" charset="0"/>
-            </a:endParaRPr>
-          </a:p>
-          <a:p>
-            <a:r>
-              <a:rPr lang="sv-SE" sz="1400" dirty="0" err="1">
-                <a:solidFill>
-                  <a:srgbClr val="0000FF"/>
-                </a:solidFill>
-                <a:latin typeface="Lucida Console" panose="020B0609040504020204" pitchFamily="49" charset="0"/>
-              </a:rPr>
-              <a:t>Measure-Command</a:t>
-            </a:r>
-            <a:r>
-              <a:rPr lang="sv-SE" sz="1400" dirty="0">
-                <a:solidFill>
-                  <a:prstClr val="black"/>
-                </a:solidFill>
-                <a:latin typeface="Lucida Console" panose="020B0609040504020204" pitchFamily="49" charset="0"/>
-              </a:rPr>
-              <a:t> {    </a:t>
-            </a:r>
-          </a:p>
-          <a:p>
-            <a:r>
-              <a:rPr lang="sv-SE" sz="1400" dirty="0">
-                <a:solidFill>
-                  <a:prstClr val="black"/>
-                </a:solidFill>
-                <a:latin typeface="Lucida Console" panose="020B0609040504020204" pitchFamily="49" charset="0"/>
-              </a:rPr>
-              <a:t>    </a:t>
-            </a:r>
-            <a:r>
-              <a:rPr lang="sv-SE" sz="1400" dirty="0">
-                <a:solidFill>
-                  <a:srgbClr val="0000FF"/>
-                </a:solidFill>
-                <a:latin typeface="Lucida Console" panose="020B0609040504020204" pitchFamily="49" charset="0"/>
-              </a:rPr>
-              <a:t>Get-</a:t>
-            </a:r>
-            <a:r>
-              <a:rPr lang="sv-SE" sz="1400" dirty="0" err="1">
-                <a:solidFill>
-                  <a:srgbClr val="0000FF"/>
-                </a:solidFill>
-                <a:latin typeface="Lucida Console" panose="020B0609040504020204" pitchFamily="49" charset="0"/>
-              </a:rPr>
-              <a:t>Sum</a:t>
-            </a:r>
-            <a:r>
-              <a:rPr lang="sv-SE" sz="1400" dirty="0">
-                <a:solidFill>
-                  <a:prstClr val="black"/>
-                </a:solidFill>
-                <a:latin typeface="Lucida Console" panose="020B0609040504020204" pitchFamily="49" charset="0"/>
-              </a:rPr>
-              <a:t> </a:t>
-            </a:r>
-            <a:r>
-              <a:rPr lang="sv-SE" sz="1400" dirty="0">
-                <a:solidFill>
-                  <a:srgbClr val="000080"/>
-                </a:solidFill>
-                <a:latin typeface="Lucida Console" panose="020B0609040504020204" pitchFamily="49" charset="0"/>
-              </a:rPr>
-              <a:t>-</a:t>
-            </a:r>
-            <a:r>
-              <a:rPr lang="sv-SE" sz="1400" dirty="0" err="1">
-                <a:solidFill>
-                  <a:srgbClr val="000080"/>
-                </a:solidFill>
-                <a:latin typeface="Lucida Console" panose="020B0609040504020204" pitchFamily="49" charset="0"/>
-              </a:rPr>
-              <a:t>Number</a:t>
-            </a:r>
-            <a:r>
-              <a:rPr lang="sv-SE" sz="1400" dirty="0">
-                <a:solidFill>
-                  <a:prstClr val="black"/>
-                </a:solidFill>
-                <a:latin typeface="Lucida Console" panose="020B0609040504020204" pitchFamily="49" charset="0"/>
-              </a:rPr>
-              <a:t> </a:t>
-            </a:r>
-            <a:r>
-              <a:rPr lang="sv-SE" sz="1400" dirty="0">
-                <a:solidFill>
-                  <a:srgbClr val="FF4500"/>
-                </a:solidFill>
-                <a:latin typeface="Lucida Console" panose="020B0609040504020204" pitchFamily="49" charset="0"/>
-              </a:rPr>
-              <a:t>$</a:t>
-            </a:r>
-            <a:r>
-              <a:rPr lang="sv-SE" sz="1400" dirty="0" err="1">
-                <a:solidFill>
-                  <a:srgbClr val="FF4500"/>
-                </a:solidFill>
-                <a:latin typeface="Lucida Console" panose="020B0609040504020204" pitchFamily="49" charset="0"/>
-              </a:rPr>
-              <a:t>numbers</a:t>
-            </a:r>
-            <a:endParaRPr lang="sv-SE" sz="1400" dirty="0">
-              <a:solidFill>
-                <a:prstClr val="black"/>
-              </a:solidFill>
-              <a:latin typeface="Lucida Console" panose="020B0609040504020204" pitchFamily="49" charset="0"/>
-            </a:endParaRPr>
-          </a:p>
-          <a:p>
-            <a:r>
-              <a:rPr lang="sv-SE" sz="1400" dirty="0">
-                <a:solidFill>
-                  <a:prstClr val="black"/>
-                </a:solidFill>
-                <a:latin typeface="Lucida Console" panose="020B0609040504020204" pitchFamily="49" charset="0"/>
-              </a:rPr>
-              <a:t>} </a:t>
-            </a:r>
-          </a:p>
-          <a:p>
-            <a:endParaRPr lang="en-US" dirty="0">
-              <a:solidFill>
-                <a:srgbClr val="FF0000"/>
-              </a:solidFill>
-              <a:latin typeface="Lucida Console" panose="020B0609040504020204" pitchFamily="49" charset="0"/>
-            </a:endParaRPr>
-          </a:p>
-          <a:p>
-            <a:endParaRPr lang="en-US" dirty="0">
-              <a:solidFill>
-                <a:srgbClr val="FF0000"/>
-              </a:solidFill>
-              <a:latin typeface="Lucida Console" panose="020B0609040504020204" pitchFamily="49" charset="0"/>
-            </a:endParaRPr>
-          </a:p>
-          <a:p>
-            <a:endParaRPr lang="en-US" dirty="0">
-              <a:solidFill>
-                <a:srgbClr val="FF0000"/>
-              </a:solidFill>
-              <a:latin typeface="Lucida Console" panose="020B0609040504020204" pitchFamily="49" charset="0"/>
-            </a:endParaRPr>
-          </a:p>
-          <a:p>
-            <a:endParaRPr lang="en-US" dirty="0">
-              <a:solidFill>
-                <a:srgbClr val="FF0000"/>
-              </a:solidFill>
-              <a:latin typeface="Lucida Console" panose="020B0609040504020204" pitchFamily="49" charset="0"/>
-            </a:endParaRPr>
-          </a:p>
-          <a:p>
-            <a:endParaRPr lang="en-US" dirty="0">
-              <a:solidFill>
-                <a:srgbClr val="FF0000"/>
-              </a:solidFill>
-              <a:latin typeface="Lucida Console" panose="020B0609040504020204" pitchFamily="49" charset="0"/>
-            </a:endParaRPr>
+            <a:pPr>
+              <a:lnSpc>
+                <a:spcPct val="150000"/>
+              </a:lnSpc>
+            </a:pPr>
+            <a:r>
+              <a:rPr lang="de-DE" dirty="0" err="1"/>
+              <a:t>Make</a:t>
+            </a:r>
+            <a:r>
+              <a:rPr lang="de-DE" dirty="0"/>
+              <a:t> </a:t>
+            </a:r>
+            <a:r>
+              <a:rPr lang="de-DE" dirty="0" err="1"/>
+              <a:t>sure</a:t>
+            </a:r>
+            <a:r>
+              <a:rPr lang="de-DE" dirty="0"/>
+              <a:t> </a:t>
+            </a:r>
+            <a:r>
+              <a:rPr lang="de-DE" dirty="0" err="1"/>
+              <a:t>your</a:t>
+            </a:r>
+            <a:r>
+              <a:rPr lang="de-DE" dirty="0"/>
+              <a:t> </a:t>
+            </a:r>
+            <a:r>
+              <a:rPr lang="de-DE" dirty="0" err="1"/>
+              <a:t>functions</a:t>
+            </a:r>
+            <a:r>
+              <a:rPr lang="de-DE" dirty="0"/>
+              <a:t>/</a:t>
+            </a:r>
+            <a:r>
+              <a:rPr lang="de-DE" dirty="0" err="1"/>
+              <a:t>cmdlets</a:t>
+            </a:r>
+            <a:r>
+              <a:rPr lang="de-DE" dirty="0"/>
+              <a:t> </a:t>
+            </a:r>
+            <a:r>
+              <a:rPr lang="de-DE" dirty="0" err="1"/>
+              <a:t>provides</a:t>
+            </a:r>
+            <a:r>
+              <a:rPr lang="de-DE" dirty="0"/>
+              <a:t> </a:t>
+            </a:r>
+            <a:r>
+              <a:rPr lang="de-DE" dirty="0" err="1"/>
+              <a:t>array</a:t>
+            </a:r>
+            <a:r>
+              <a:rPr lang="de-DE" dirty="0"/>
+              <a:t> </a:t>
+            </a:r>
+            <a:r>
+              <a:rPr lang="de-DE" dirty="0" err="1"/>
+              <a:t>input</a:t>
+            </a:r>
+            <a:endParaRPr lang="de-DE" dirty="0"/>
+          </a:p>
+          <a:p>
+            <a:pPr>
+              <a:lnSpc>
+                <a:spcPct val="150000"/>
+              </a:lnSpc>
+            </a:pPr>
+            <a:r>
+              <a:rPr lang="de-DE" dirty="0" err="1"/>
+              <a:t>Avoid</a:t>
+            </a:r>
+            <a:r>
+              <a:rPr lang="de-DE" dirty="0"/>
+              <a:t> </a:t>
+            </a:r>
+            <a:r>
+              <a:rPr lang="de-DE" dirty="0" err="1"/>
+              <a:t>the</a:t>
+            </a:r>
+            <a:r>
+              <a:rPr lang="de-DE" dirty="0"/>
+              <a:t> </a:t>
+            </a:r>
+            <a:r>
+              <a:rPr lang="de-DE" dirty="0" err="1"/>
+              <a:t>pipeline</a:t>
+            </a:r>
+            <a:r>
+              <a:rPr lang="de-DE" dirty="0"/>
+              <a:t> </a:t>
+            </a:r>
+            <a:r>
+              <a:rPr lang="de-DE" dirty="0" err="1"/>
+              <a:t>where</a:t>
+            </a:r>
+            <a:r>
+              <a:rPr lang="de-DE" dirty="0"/>
+              <a:t> </a:t>
+            </a:r>
+            <a:r>
+              <a:rPr lang="de-DE" dirty="0" err="1"/>
+              <a:t>performance</a:t>
+            </a:r>
+            <a:r>
+              <a:rPr lang="de-DE" dirty="0"/>
+              <a:t> </a:t>
+            </a:r>
+            <a:r>
+              <a:rPr lang="de-DE" dirty="0" err="1"/>
+              <a:t>is</a:t>
+            </a:r>
+            <a:r>
+              <a:rPr lang="de-DE" dirty="0"/>
+              <a:t> </a:t>
+            </a:r>
+            <a:r>
+              <a:rPr lang="de-DE" dirty="0" err="1"/>
+              <a:t>important</a:t>
+            </a:r>
+            <a:endParaRPr lang="de-DE" dirty="0"/>
+          </a:p>
+          <a:p>
+            <a:pPr lvl="1">
+              <a:lnSpc>
+                <a:spcPct val="150000"/>
+              </a:lnSpc>
+            </a:pPr>
+            <a:r>
+              <a:rPr lang="de-DE" dirty="0" err="1"/>
+              <a:t>Prefer</a:t>
+            </a:r>
+            <a:r>
+              <a:rPr lang="de-DE" dirty="0"/>
+              <a:t> </a:t>
+            </a:r>
+            <a:r>
+              <a:rPr lang="de-DE" dirty="0" err="1"/>
+              <a:t>looping</a:t>
+            </a:r>
+            <a:r>
+              <a:rPr lang="de-DE" dirty="0"/>
+              <a:t> / </a:t>
+            </a:r>
+            <a:r>
+              <a:rPr lang="de-DE" dirty="0" err="1"/>
+              <a:t>magic</a:t>
+            </a:r>
+            <a:r>
+              <a:rPr lang="de-DE" dirty="0"/>
+              <a:t> </a:t>
+            </a:r>
+            <a:r>
+              <a:rPr lang="de-DE" dirty="0" err="1"/>
+              <a:t>methods</a:t>
+            </a:r>
+            <a:endParaRPr lang="de-DE" dirty="0"/>
+          </a:p>
+          <a:p>
+            <a:pPr>
+              <a:lnSpc>
+                <a:spcPct val="150000"/>
+              </a:lnSpc>
+            </a:pPr>
+            <a:r>
+              <a:rPr lang="de-DE" dirty="0"/>
+              <a:t>Drop down </a:t>
+            </a:r>
+            <a:r>
+              <a:rPr lang="de-DE" dirty="0" err="1"/>
+              <a:t>to</a:t>
+            </a:r>
+            <a:r>
+              <a:rPr lang="de-DE" dirty="0"/>
+              <a:t> .NET </a:t>
+            </a:r>
+            <a:r>
+              <a:rPr lang="de-DE" dirty="0" err="1"/>
+              <a:t>when</a:t>
+            </a:r>
+            <a:r>
+              <a:rPr lang="de-DE" dirty="0"/>
+              <a:t> </a:t>
+            </a:r>
+            <a:r>
+              <a:rPr lang="de-DE" dirty="0" err="1"/>
+              <a:t>you</a:t>
+            </a:r>
+            <a:r>
+              <a:rPr lang="de-DE" dirty="0"/>
+              <a:t> </a:t>
+            </a:r>
+            <a:r>
+              <a:rPr lang="de-DE" dirty="0" err="1"/>
+              <a:t>have</a:t>
+            </a:r>
+            <a:r>
+              <a:rPr lang="de-DE" dirty="0"/>
+              <a:t> </a:t>
+            </a:r>
+            <a:r>
+              <a:rPr lang="de-DE" dirty="0" err="1"/>
+              <a:t>to</a:t>
+            </a:r>
+            <a:endParaRPr lang="de-DE" dirty="0"/>
+          </a:p>
+          <a:p>
+            <a:pPr>
+              <a:lnSpc>
+                <a:spcPct val="150000"/>
+              </a:lnSpc>
+            </a:pPr>
+            <a:endParaRPr lang="de-DE" dirty="0"/>
           </a:p>
         </p:txBody>
       </p:sp>
     </p:spTree>
     <p:extLst>
       <p:ext uri="{BB962C8B-B14F-4D97-AF65-F5344CB8AC3E}">
-        <p14:creationId xmlns:p14="http://schemas.microsoft.com/office/powerpoint/2010/main" val="1348754497"/>
+        <p14:creationId xmlns:p14="http://schemas.microsoft.com/office/powerpoint/2010/main" val="697367777"/>
       </p:ext>
     </p:extLst>
   </p:cSld>
@@ -5781,12 +5137,12 @@
   </p:clrMapOvr>
   <mc:AlternateContent xmlns:mc="http://schemas.openxmlformats.org/markup-compatibility/2006" xmlns:p14="http://schemas.microsoft.com/office/powerpoint/2010/main">
     <mc:Choice Requires="p14">
-      <p:transition spd="slow" p14:dur="1300">
-        <p14:pan dir="u"/>
+      <p:transition spd="med" p14:dur="700">
+        <p:fade/>
       </p:transition>
     </mc:Choice>
     <mc:Fallback xmlns="">
-      <p:transition spd="slow">
+      <p:transition spd="med">
         <p:fade/>
       </p:transition>
     </mc:Fallback>
@@ -5813,37 +5169,7 @@
       </p:grpSpPr>
       <p:sp>
         <p:nvSpPr>
-          <p:cNvPr id="2" name="Titel 1"/>
-          <p:cNvSpPr>
-            <a:spLocks noGrp="1"/>
-          </p:cNvSpPr>
-          <p:nvPr>
-            <p:ph type="title"/>
-          </p:nvPr>
-        </p:nvSpPr>
-        <p:spPr>
-          <a:xfrm>
-            <a:off x="0" y="908720"/>
-            <a:ext cx="9144000" cy="792088"/>
-          </a:xfrm>
-          <a:prstGeom prst="rect">
-            <a:avLst/>
-          </a:prstGeom>
-        </p:spPr>
-        <p:txBody>
-          <a:bodyPr/>
-          <a:lstStyle/>
-          <a:p>
-            <a:r>
-              <a:rPr lang="de-DE" dirty="0"/>
-              <a:t>Summary</a:t>
-            </a:r>
-          </a:p>
-        </p:txBody>
-      </p:sp>
-      <p:sp>
-        <p:nvSpPr>
-          <p:cNvPr id="3" name="Inhaltsplatzhalter 2"/>
+          <p:cNvPr id="2" name="Inhaltsplatzhalter 1"/>
           <p:cNvSpPr>
             <a:spLocks noGrp="1"/>
           </p:cNvSpPr>
@@ -5856,30 +5182,33 @@
           <a:bodyPr/>
           <a:lstStyle/>
           <a:p>
-            <a:pPr>
-              <a:lnSpc>
-                <a:spcPct val="150000"/>
-              </a:lnSpc>
-            </a:pPr>
             <a:r>
               <a:rPr lang="de-DE" dirty="0" err="1"/>
-              <a:t>Make</a:t>
-            </a:r>
-            <a:r>
-              <a:rPr lang="de-DE" dirty="0"/>
-              <a:t> </a:t>
+              <a:t>Now</a:t>
+            </a:r>
+            <a:r>
+              <a:rPr lang="de-DE" dirty="0"/>
+              <a:t>: 15 min break</a:t>
+            </a:r>
+          </a:p>
+          <a:p>
+            <a:endParaRPr lang="de-DE" dirty="0"/>
+          </a:p>
+          <a:p>
+            <a:r>
+              <a:rPr lang="de-DE" dirty="0"/>
+              <a:t>Grab a </a:t>
             </a:r>
             <a:r>
               <a:rPr lang="de-DE" dirty="0" err="1"/>
-              <a:t>sure</a:t>
-            </a:r>
-            <a:r>
-              <a:rPr lang="de-DE" dirty="0"/>
-              <a:t> </a:t>
-            </a:r>
+              <a:t>coffee</a:t>
+            </a:r>
+            <a:endParaRPr lang="de-DE" dirty="0"/>
+          </a:p>
+          <a:p>
             <a:r>
               <a:rPr lang="de-DE" dirty="0" err="1"/>
-              <a:t>your</a:t>
+              <a:t>Stay</a:t>
             </a:r>
             <a:r>
               <a:rPr lang="de-DE" dirty="0"/>
@@ -5887,147 +5216,11 @@
             </a:r>
             <a:r>
               <a:rPr lang="de-DE" dirty="0" err="1"/>
-              <a:t>functions</a:t>
-            </a:r>
-            <a:r>
-              <a:rPr lang="de-DE" dirty="0"/>
-              <a:t>/</a:t>
-            </a:r>
-            <a:r>
-              <a:rPr lang="de-DE" dirty="0" err="1"/>
-              <a:t>cmdlets</a:t>
-            </a:r>
-            <a:r>
-              <a:rPr lang="de-DE" dirty="0"/>
-              <a:t> </a:t>
-            </a:r>
-            <a:r>
-              <a:rPr lang="de-DE" dirty="0" err="1"/>
-              <a:t>provides</a:t>
-            </a:r>
-            <a:r>
-              <a:rPr lang="de-DE" dirty="0"/>
-              <a:t> </a:t>
-            </a:r>
-            <a:r>
-              <a:rPr lang="de-DE" dirty="0" err="1"/>
-              <a:t>array</a:t>
-            </a:r>
-            <a:r>
-              <a:rPr lang="de-DE" dirty="0"/>
-              <a:t> </a:t>
-            </a:r>
-            <a:r>
-              <a:rPr lang="de-DE" dirty="0" err="1"/>
-              <a:t>input</a:t>
-            </a:r>
-            <a:endParaRPr lang="de-DE" dirty="0"/>
-          </a:p>
-          <a:p>
-            <a:pPr>
-              <a:lnSpc>
-                <a:spcPct val="150000"/>
-              </a:lnSpc>
-            </a:pPr>
-            <a:r>
-              <a:rPr lang="de-DE" dirty="0" err="1"/>
-              <a:t>Avoid</a:t>
-            </a:r>
-            <a:r>
-              <a:rPr lang="de-DE" dirty="0"/>
-              <a:t> </a:t>
-            </a:r>
-            <a:r>
-              <a:rPr lang="de-DE" dirty="0" err="1"/>
-              <a:t>the</a:t>
-            </a:r>
-            <a:r>
-              <a:rPr lang="de-DE" dirty="0"/>
-              <a:t> </a:t>
-            </a:r>
-            <a:r>
-              <a:rPr lang="de-DE" dirty="0" err="1"/>
-              <a:t>pipeline</a:t>
-            </a:r>
-            <a:r>
-              <a:rPr lang="de-DE" dirty="0"/>
-              <a:t> </a:t>
-            </a:r>
-            <a:r>
-              <a:rPr lang="de-DE" dirty="0" err="1"/>
-              <a:t>where</a:t>
-            </a:r>
-            <a:r>
-              <a:rPr lang="de-DE" dirty="0"/>
-              <a:t> </a:t>
-            </a:r>
-            <a:r>
-              <a:rPr lang="de-DE" dirty="0" err="1"/>
-              <a:t>performance</a:t>
-            </a:r>
-            <a:r>
-              <a:rPr lang="de-DE" dirty="0"/>
-              <a:t> </a:t>
-            </a:r>
-            <a:r>
-              <a:rPr lang="de-DE" dirty="0" err="1"/>
-              <a:t>is</a:t>
-            </a:r>
-            <a:r>
-              <a:rPr lang="de-DE" dirty="0"/>
-              <a:t> </a:t>
-            </a:r>
-            <a:r>
-              <a:rPr lang="de-DE" dirty="0" err="1"/>
-              <a:t>important</a:t>
-            </a:r>
-            <a:endParaRPr lang="de-DE" dirty="0"/>
-          </a:p>
-          <a:p>
-            <a:pPr lvl="1">
-              <a:lnSpc>
-                <a:spcPct val="150000"/>
-              </a:lnSpc>
-            </a:pPr>
-            <a:r>
-              <a:rPr lang="de-DE" dirty="0" err="1"/>
-              <a:t>Prefer</a:t>
-            </a:r>
-            <a:r>
-              <a:rPr lang="de-DE" dirty="0"/>
-              <a:t> </a:t>
-            </a:r>
-            <a:r>
-              <a:rPr lang="de-DE" dirty="0" err="1"/>
-              <a:t>looping</a:t>
-            </a:r>
-            <a:r>
-              <a:rPr lang="de-DE" dirty="0"/>
-              <a:t> / </a:t>
-            </a:r>
-            <a:r>
-              <a:rPr lang="de-DE" dirty="0" err="1"/>
-              <a:t>magic</a:t>
-            </a:r>
-            <a:r>
-              <a:rPr lang="de-DE" dirty="0"/>
-              <a:t> </a:t>
-            </a:r>
-            <a:r>
-              <a:rPr lang="de-DE" dirty="0" err="1"/>
-              <a:t>methods</a:t>
-            </a:r>
-            <a:endParaRPr lang="de-DE" dirty="0"/>
-          </a:p>
-          <a:p>
-            <a:pPr>
-              <a:lnSpc>
-                <a:spcPct val="150000"/>
-              </a:lnSpc>
-            </a:pPr>
-            <a:r>
-              <a:rPr lang="de-DE" dirty="0"/>
-              <a:t>Drop down </a:t>
+              <a:t>here</a:t>
+            </a:r>
+            <a:r>
+              <a:rPr lang="de-DE" dirty="0"/>
+              <a:t> </a:t>
             </a:r>
             <a:r>
               <a:rPr lang="de-DE" dirty="0" err="1"/>
@@ -6035,11 +5228,11 @@
             </a:r>
             <a:r>
               <a:rPr lang="de-DE" dirty="0"/>
-              <a:t> .NET </a:t>
+              <a:t> </a:t>
             </a:r>
             <a:r>
               <a:rPr lang="de-DE" dirty="0" err="1"/>
-              <a:t>when</a:t>
+              <a:t>enjoy</a:t>
             </a:r>
             <a:r>
               <a:rPr lang="de-DE" dirty="0"/>
@@ -6047,7 +5240,7 @@
             </a:r>
             <a:r>
               <a:rPr lang="de-DE" dirty="0" err="1"/>
-              <a:t>you</a:t>
+              <a:t>next</a:t>
             </a:r>
             <a:r>
               <a:rPr lang="de-DE" dirty="0"/>
@@ -6055,7 +5248,34 @@
             </a:r>
             <a:r>
               <a:rPr lang="de-DE" dirty="0" err="1"/>
-              <a:t>have</a:t>
+              <a:t>presentation</a:t>
+            </a:r>
+            <a:endParaRPr lang="de-DE" dirty="0"/>
+          </a:p>
+          <a:p>
+            <a:r>
+              <a:rPr lang="de-DE" dirty="0"/>
+              <a:t>Change </a:t>
+            </a:r>
+            <a:r>
+              <a:rPr lang="de-DE" dirty="0" err="1"/>
+              <a:t>track</a:t>
+            </a:r>
+            <a:r>
+              <a:rPr lang="de-DE" dirty="0"/>
+              <a:t> </a:t>
+            </a:r>
+            <a:r>
+              <a:rPr lang="de-DE" dirty="0" err="1"/>
+              <a:t>and</a:t>
+            </a:r>
+            <a:r>
+              <a:rPr lang="de-DE" dirty="0"/>
+              <a:t> </a:t>
+            </a:r>
+            <a:r>
+              <a:rPr lang="de-DE" dirty="0" err="1"/>
+              <a:t>switch</a:t>
             </a:r>
             <a:r>
               <a:rPr lang="de-DE" dirty="0"/>
@@ -6065,22 +5285,142 @@
               <a:rPr lang="de-DE" dirty="0" err="1"/>
               <a:t>to</a:t>
             </a:r>
+            <a:r>
+              <a:rPr lang="de-DE" dirty="0"/>
+              <a:t> </a:t>
+            </a:r>
+            <a:r>
+              <a:rPr lang="de-DE" dirty="0" err="1"/>
+              <a:t>another</a:t>
+            </a:r>
+            <a:r>
+              <a:rPr lang="de-DE" dirty="0"/>
+              <a:t> </a:t>
+            </a:r>
+            <a:r>
+              <a:rPr lang="de-DE" dirty="0" err="1"/>
+              <a:t>room</a:t>
+            </a:r>
             <a:endParaRPr lang="de-DE" dirty="0"/>
           </a:p>
           <a:p>
-            <a:pPr>
-              <a:lnSpc>
-                <a:spcPct val="150000"/>
-              </a:lnSpc>
-            </a:pPr>
             <a:endParaRPr lang="de-DE" dirty="0"/>
+          </a:p>
+          <a:p>
+            <a:r>
+              <a:rPr lang="de-DE" dirty="0" err="1"/>
+              <a:t>Ask</a:t>
+            </a:r>
+            <a:r>
+              <a:rPr lang="de-DE" dirty="0"/>
+              <a:t> </a:t>
+            </a:r>
+            <a:r>
+              <a:rPr lang="de-DE" dirty="0" err="1"/>
+              <a:t>me</a:t>
+            </a:r>
+            <a:r>
+              <a:rPr lang="de-DE" dirty="0"/>
+              <a:t> </a:t>
+            </a:r>
+            <a:r>
+              <a:rPr lang="de-DE" dirty="0" err="1"/>
+              <a:t>questions</a:t>
+            </a:r>
+            <a:r>
+              <a:rPr lang="de-DE" dirty="0"/>
+              <a:t> </a:t>
+            </a:r>
+            <a:r>
+              <a:rPr lang="de-DE" dirty="0" err="1"/>
+              <a:t>or</a:t>
+            </a:r>
+            <a:r>
+              <a:rPr lang="de-DE" dirty="0"/>
+              <a:t> </a:t>
+            </a:r>
+            <a:r>
+              <a:rPr lang="de-DE" dirty="0" err="1"/>
+              <a:t>meet</a:t>
+            </a:r>
+            <a:r>
+              <a:rPr lang="de-DE" dirty="0"/>
+              <a:t> </a:t>
+            </a:r>
+            <a:r>
+              <a:rPr lang="de-DE" dirty="0" err="1"/>
+              <a:t>me</a:t>
+            </a:r>
+            <a:r>
+              <a:rPr lang="de-DE" dirty="0"/>
+              <a:t> in a </a:t>
+            </a:r>
+            <a:r>
+              <a:rPr lang="de-DE" dirty="0" err="1"/>
+              <a:t>breakout</a:t>
+            </a:r>
+            <a:r>
+              <a:rPr lang="de-DE" dirty="0"/>
+              <a:t> </a:t>
+            </a:r>
+            <a:r>
+              <a:rPr lang="de-DE" dirty="0" err="1"/>
+              <a:t>session</a:t>
+            </a:r>
+            <a:r>
+              <a:rPr lang="de-DE" dirty="0"/>
+              <a:t> </a:t>
+            </a:r>
+            <a:r>
+              <a:rPr lang="de-DE" dirty="0" err="1"/>
+              <a:t>room</a:t>
+            </a:r>
+            <a:r>
+              <a:rPr lang="de-DE" dirty="0"/>
+              <a:t> </a:t>
+            </a:r>
+            <a:r>
+              <a:rPr lang="de-DE" dirty="0" err="1"/>
+              <a:t>afterwards</a:t>
+            </a:r>
+            <a:endParaRPr lang="de-DE" dirty="0"/>
+          </a:p>
+        </p:txBody>
+      </p:sp>
+      <p:sp>
+        <p:nvSpPr>
+          <p:cNvPr id="3" name="Titel 2"/>
+          <p:cNvSpPr>
+            <a:spLocks noGrp="1"/>
+          </p:cNvSpPr>
+          <p:nvPr>
+            <p:ph type="title"/>
+          </p:nvPr>
+        </p:nvSpPr>
+        <p:spPr/>
+        <p:txBody>
+          <a:bodyPr/>
+          <a:lstStyle/>
+          <a:p>
+            <a:r>
+              <a:rPr lang="de-DE" dirty="0"/>
+              <a:t>Next </a:t>
+            </a:r>
+            <a:r>
+              <a:rPr lang="de-DE" dirty="0" err="1"/>
+              <a:t>Steps</a:t>
+            </a:r>
+            <a:r>
+              <a:rPr lang="de-DE" dirty="0"/>
+              <a:t>...</a:t>
+            </a:r>
           </a:p>
         </p:txBody>
       </p:sp>
     </p:spTree>
     <p:extLst>
       <p:ext uri="{BB962C8B-B14F-4D97-AF65-F5344CB8AC3E}">
-        <p14:creationId xmlns:p14="http://schemas.microsoft.com/office/powerpoint/2010/main" val="697367777"/>
+        <p14:creationId xmlns:p14="http://schemas.microsoft.com/office/powerpoint/2010/main" val="3397310615"/>
       </p:ext>
     </p:extLst>
   </p:cSld>
@@ -6121,298 +5461,6 @@
       </p:grpSpPr>
       <p:sp>
         <p:nvSpPr>
-          <p:cNvPr id="2" name="Inhaltsplatzhalter 1"/>
-          <p:cNvSpPr>
-            <a:spLocks noGrp="1"/>
-          </p:cNvSpPr>
-          <p:nvPr>
-            <p:ph idx="1"/>
-          </p:nvPr>
-        </p:nvSpPr>
-        <p:spPr/>
-        <p:txBody>
-          <a:bodyPr/>
-          <a:lstStyle/>
-          <a:p>
-            <a:r>
-              <a:rPr lang="de-DE" dirty="0" err="1"/>
-              <a:t>Now</a:t>
-            </a:r>
-            <a:r>
-              <a:rPr lang="de-DE" dirty="0"/>
-              <a:t>: 15 min break</a:t>
-            </a:r>
-          </a:p>
-          <a:p>
-            <a:endParaRPr lang="de-DE" dirty="0"/>
-          </a:p>
-          <a:p>
-            <a:r>
-              <a:rPr lang="de-DE" dirty="0"/>
-              <a:t>Grab a </a:t>
-            </a:r>
-            <a:r>
-              <a:rPr lang="de-DE" dirty="0" err="1"/>
-              <a:t>coffee</a:t>
-            </a:r>
-            <a:endParaRPr lang="de-DE" dirty="0"/>
-          </a:p>
-          <a:p>
-            <a:r>
-              <a:rPr lang="de-DE" dirty="0" err="1"/>
-              <a:t>Stay</a:t>
-            </a:r>
-            <a:r>
-              <a:rPr lang="de-DE" dirty="0"/>
-              <a:t> </a:t>
-            </a:r>
-            <a:r>
-              <a:rPr lang="de-DE" dirty="0" err="1"/>
-              <a:t>here</a:t>
-            </a:r>
-            <a:r>
-              <a:rPr lang="de-DE" dirty="0"/>
-              <a:t> </a:t>
-            </a:r>
-            <a:r>
-              <a:rPr lang="de-DE" dirty="0" err="1"/>
-              <a:t>to</a:t>
-            </a:r>
-            <a:r>
-              <a:rPr lang="de-DE" dirty="0"/>
-              <a:t> </a:t>
-            </a:r>
-            <a:r>
-              <a:rPr lang="de-DE" dirty="0" err="1"/>
-              <a:t>enjoy</a:t>
-            </a:r>
-            <a:r>
-              <a:rPr lang="de-DE" dirty="0"/>
-              <a:t> </a:t>
-            </a:r>
-            <a:r>
-              <a:rPr lang="de-DE" dirty="0" err="1"/>
-              <a:t>next</a:t>
-            </a:r>
-            <a:r>
-              <a:rPr lang="de-DE" dirty="0"/>
-              <a:t> </a:t>
-            </a:r>
-            <a:r>
-              <a:rPr lang="de-DE" dirty="0" err="1"/>
-              <a:t>presentation</a:t>
-            </a:r>
-            <a:endParaRPr lang="de-DE" dirty="0"/>
-          </a:p>
-          <a:p>
-            <a:r>
-              <a:rPr lang="de-DE" dirty="0"/>
-              <a:t>Change </a:t>
-            </a:r>
-            <a:r>
-              <a:rPr lang="de-DE" dirty="0" err="1"/>
-              <a:t>track</a:t>
-            </a:r>
-            <a:r>
-              <a:rPr lang="de-DE" dirty="0"/>
-              <a:t> </a:t>
-            </a:r>
-            <a:r>
-              <a:rPr lang="de-DE" dirty="0" err="1"/>
-              <a:t>and</a:t>
-            </a:r>
-            <a:r>
-              <a:rPr lang="de-DE" dirty="0"/>
-              <a:t> </a:t>
-            </a:r>
-            <a:r>
-              <a:rPr lang="de-DE" dirty="0" err="1"/>
-              <a:t>switch</a:t>
-            </a:r>
-            <a:r>
-              <a:rPr lang="de-DE" dirty="0"/>
-              <a:t> </a:t>
-            </a:r>
-            <a:r>
-              <a:rPr lang="de-DE" dirty="0" err="1"/>
-              <a:t>to</a:t>
-            </a:r>
-            <a:r>
-              <a:rPr lang="de-DE" dirty="0"/>
-              <a:t> </a:t>
-            </a:r>
-            <a:r>
-              <a:rPr lang="de-DE" dirty="0" err="1"/>
-              <a:t>another</a:t>
-            </a:r>
-            <a:r>
-              <a:rPr lang="de-DE" dirty="0"/>
-              <a:t> </a:t>
-            </a:r>
-            <a:r>
-              <a:rPr lang="de-DE" dirty="0" err="1"/>
-              <a:t>room</a:t>
-            </a:r>
-            <a:endParaRPr lang="de-DE" dirty="0"/>
-          </a:p>
-          <a:p>
-            <a:endParaRPr lang="de-DE" dirty="0"/>
-          </a:p>
-          <a:p>
-            <a:r>
-              <a:rPr lang="de-DE" dirty="0" err="1"/>
-              <a:t>Ask</a:t>
-            </a:r>
-            <a:r>
-              <a:rPr lang="de-DE" dirty="0"/>
-              <a:t> </a:t>
-            </a:r>
-            <a:r>
-              <a:rPr lang="de-DE" dirty="0" err="1"/>
-              <a:t>me</a:t>
-            </a:r>
-            <a:r>
-              <a:rPr lang="de-DE" dirty="0"/>
-              <a:t> </a:t>
-            </a:r>
-            <a:r>
-              <a:rPr lang="de-DE" dirty="0" err="1"/>
-              <a:t>questions</a:t>
-            </a:r>
-            <a:r>
-              <a:rPr lang="de-DE" dirty="0"/>
-              <a:t> </a:t>
-            </a:r>
-            <a:r>
-              <a:rPr lang="de-DE" dirty="0" err="1"/>
-              <a:t>or</a:t>
-            </a:r>
-            <a:r>
-              <a:rPr lang="de-DE" dirty="0"/>
-              <a:t> </a:t>
-            </a:r>
-            <a:r>
-              <a:rPr lang="de-DE" dirty="0" err="1"/>
-              <a:t>meet</a:t>
-            </a:r>
-            <a:r>
-              <a:rPr lang="de-DE" dirty="0"/>
-              <a:t> </a:t>
-            </a:r>
-            <a:r>
-              <a:rPr lang="de-DE" dirty="0" err="1"/>
-              <a:t>me</a:t>
-            </a:r>
-            <a:r>
-              <a:rPr lang="de-DE" dirty="0"/>
-              <a:t> in a </a:t>
-            </a:r>
-            <a:r>
-              <a:rPr lang="de-DE" dirty="0" err="1"/>
-              <a:t>breakout</a:t>
-            </a:r>
-            <a:r>
-              <a:rPr lang="de-DE" dirty="0"/>
-              <a:t> </a:t>
-            </a:r>
-            <a:r>
-              <a:rPr lang="de-DE" dirty="0" err="1"/>
-              <a:t>session</a:t>
-            </a:r>
-            <a:r>
-              <a:rPr lang="de-DE" dirty="0"/>
-              <a:t> </a:t>
-            </a:r>
-            <a:r>
-              <a:rPr lang="de-DE" dirty="0" err="1"/>
-              <a:t>room</a:t>
-            </a:r>
-            <a:r>
-              <a:rPr lang="de-DE" dirty="0"/>
-              <a:t> </a:t>
-            </a:r>
-            <a:r>
-              <a:rPr lang="de-DE" dirty="0" err="1"/>
-              <a:t>afterwards</a:t>
-            </a:r>
-            <a:endParaRPr lang="de-DE" dirty="0"/>
-          </a:p>
-        </p:txBody>
-      </p:sp>
-      <p:sp>
-        <p:nvSpPr>
-          <p:cNvPr id="3" name="Titel 2"/>
-          <p:cNvSpPr>
-            <a:spLocks noGrp="1"/>
-          </p:cNvSpPr>
-          <p:nvPr>
-            <p:ph type="title"/>
-          </p:nvPr>
-        </p:nvSpPr>
-        <p:spPr/>
-        <p:txBody>
-          <a:bodyPr/>
-          <a:lstStyle/>
-          <a:p>
-            <a:r>
-              <a:rPr lang="de-DE" dirty="0"/>
-              <a:t>Next </a:t>
-            </a:r>
-            <a:r>
-              <a:rPr lang="de-DE" dirty="0" err="1"/>
-              <a:t>Steps</a:t>
-            </a:r>
-            <a:r>
-              <a:rPr lang="de-DE" dirty="0"/>
-              <a:t>...</a:t>
-            </a:r>
-          </a:p>
-        </p:txBody>
-      </p:sp>
-    </p:spTree>
-    <p:extLst>
-      <p:ext uri="{BB962C8B-B14F-4D97-AF65-F5344CB8AC3E}">
-        <p14:creationId xmlns:p14="http://schemas.microsoft.com/office/powerpoint/2010/main" val="3397310615"/>
-      </p:ext>
-    </p:extLst>
-  </p:cSld>
-  <p:clrMapOvr>
-    <a:masterClrMapping/>
-  </p:clrMapOvr>
-  <mc:AlternateContent xmlns:mc="http://schemas.openxmlformats.org/markup-compatibility/2006" xmlns:p14="http://schemas.microsoft.com/office/powerpoint/2010/main">
-    <mc:Choice Requires="p14">
-      <p:transition spd="med" p14:dur="700">
-        <p:fade/>
-      </p:transition>
-    </mc:Choice>
-    <mc:Fallback xmlns="">
-      <p:transition spd="med">
-        <p:fade/>
-      </p:transition>
-    </mc:Fallback>
-  </mc:AlternateContent>
-</p:sld>
-</file>
-
-<file path=ppt/slides/slide15.xml><?xml version="1.0" encoding="utf-8"?>
-<p:sld xmlns:a="http://schemas.openxmlformats.org/drawingml/2006/main" xmlns:r="http://schemas.openxmlformats.org/officeDocument/2006/relationships" xmlns:p="http://schemas.openxmlformats.org/presentationml/2006/main">
-  <p:cSld>
-    <p:spTree>
-      <p:nvGrpSpPr>
-        <p:cNvPr id="1" name=""/>
-        <p:cNvGrpSpPr/>
-        <p:nvPr/>
-      </p:nvGrpSpPr>
-      <p:grpSpPr>
-        <a:xfrm>
-          <a:off x="0" y="0"/>
-          <a:ext cx="0" cy="0"/>
-          <a:chOff x="0" y="0"/>
-          <a:chExt cx="0" cy="0"/>
-        </a:xfrm>
-      </p:grpSpPr>
-      <p:sp>
-        <p:nvSpPr>
           <p:cNvPr id="2" name="Titel 1"/>
           <p:cNvSpPr>
             <a:spLocks noGrp="1"/>
@@ -6481,7 +5529,7 @@
 </p:sld>
 </file>
 
-<file path=ppt/slides/slide16.xml><?xml version="1.0" encoding="utf-8"?>
+<file path=ppt/slides/slide15.xml><?xml version="1.0" encoding="utf-8"?>
 <p:sld xmlns:a="http://schemas.openxmlformats.org/drawingml/2006/main" xmlns:r="http://schemas.openxmlformats.org/officeDocument/2006/relationships" xmlns:p="http://schemas.openxmlformats.org/presentationml/2006/main">
   <p:cSld>
     <p:spTree>

</xml_diff>